<commit_message>
auto backup 2023/12/08 11:54:46
</commit_message>
<xml_diff>
--- a/HuynhNhutHao_B1910062.pptx
+++ b/HuynhNhutHao_B1910062.pptx
@@ -32,16 +32,16 @@
   <p:notesSz cx="6858000" cy="9144000"/>
   <p:embeddedFontLst>
     <p:embeddedFont>
-      <p:font typeface="Roboto Slab" panose="020B0604020202020204" charset="0"/>
+      <p:font typeface="Roboto" panose="020B0604020202020204" charset="0"/>
       <p:regular r:id="rId22"/>
       <p:bold r:id="rId23"/>
+      <p:italic r:id="rId24"/>
+      <p:boldItalic r:id="rId25"/>
     </p:embeddedFont>
     <p:embeddedFont>
-      <p:font typeface="Roboto" panose="020B0604020202020204" charset="0"/>
-      <p:regular r:id="rId24"/>
-      <p:bold r:id="rId25"/>
-      <p:italic r:id="rId26"/>
-      <p:boldItalic r:id="rId27"/>
+      <p:font typeface="Roboto Slab" panose="020B0604020202020204" charset="0"/>
+      <p:regular r:id="rId26"/>
+      <p:bold r:id="rId27"/>
     </p:embeddedFont>
   </p:embeddedFontLst>
   <p:defaultTextStyle>
@@ -2431,7 +2431,7 @@
         </p:nvSpPr>
         <p:spPr>
           <a:xfrm>
-            <a:off x="381300" y="685800"/>
+            <a:off x="381000" y="685800"/>
             <a:ext cx="6096000" cy="3429000"/>
           </a:xfrm>
           <a:custGeom>
@@ -11361,10 +11361,10 @@
               <a:buChar char="❖"/>
             </a:pPr>
             <a:r>
-              <a:rPr lang="vi"/>
+              <a:rPr lang="vi" dirty="0"/>
               <a:t>CƠ SỞ LÝ THUYẾT</a:t>
             </a:r>
-            <a:endParaRPr/>
+            <a:endParaRPr dirty="0"/>
           </a:p>
           <a:p>
             <a:pPr marL="914400" lvl="1" indent="-317500" algn="l" rtl="0">
@@ -11378,10 +11378,10 @@
               <a:buChar char="➢"/>
             </a:pPr>
             <a:r>
-              <a:rPr lang="vi"/>
+              <a:rPr lang="vi" dirty="0"/>
               <a:t>Công nghệ front-end:</a:t>
             </a:r>
-            <a:endParaRPr/>
+            <a:endParaRPr dirty="0"/>
           </a:p>
           <a:p>
             <a:pPr marL="1371600" lvl="2" indent="-317500" algn="l" rtl="0">
@@ -11395,10 +11395,10 @@
               <a:buChar char="■"/>
             </a:pPr>
             <a:r>
-              <a:rPr lang="vi"/>
+              <a:rPr lang="vi" dirty="0"/>
               <a:t>HTML (Hypertext Markup Language) </a:t>
             </a:r>
-            <a:endParaRPr/>
+            <a:endParaRPr dirty="0"/>
           </a:p>
           <a:p>
             <a:pPr marL="1371600" lvl="2" indent="-317500" algn="l" rtl="0">
@@ -11412,10 +11412,10 @@
               <a:buChar char="■"/>
             </a:pPr>
             <a:r>
-              <a:rPr lang="vi"/>
+              <a:rPr lang="vi" dirty="0"/>
               <a:t>CSS (Cascading Styles Sheets)</a:t>
             </a:r>
-            <a:endParaRPr/>
+            <a:endParaRPr dirty="0"/>
           </a:p>
           <a:p>
             <a:pPr marL="1371600" lvl="2" indent="-317500" algn="l" rtl="0">
@@ -11429,10 +11429,10 @@
               <a:buChar char="■"/>
             </a:pPr>
             <a:r>
-              <a:rPr lang="vi"/>
+              <a:rPr lang="vi" dirty="0"/>
               <a:t>JS (JavaScript)</a:t>
             </a:r>
-            <a:endParaRPr/>
+            <a:endParaRPr dirty="0"/>
           </a:p>
           <a:p>
             <a:pPr marL="1371600" lvl="2" indent="-317500" algn="l" rtl="0">
@@ -11446,10 +11446,10 @@
               <a:buChar char="■"/>
             </a:pPr>
             <a:r>
-              <a:rPr lang="vi"/>
+              <a:rPr lang="vi" dirty="0"/>
               <a:t>Bootstrap</a:t>
             </a:r>
-            <a:endParaRPr/>
+            <a:endParaRPr dirty="0"/>
           </a:p>
           <a:p>
             <a:pPr marL="1371600" lvl="2" indent="-317500" algn="l" rtl="0">
@@ -11463,10 +11463,68 @@
               <a:buChar char="■"/>
             </a:pPr>
             <a:r>
-              <a:rPr lang="vi"/>
+              <a:rPr lang="vi" dirty="0" smtClean="0"/>
               <a:t>Livewire</a:t>
             </a:r>
-            <a:endParaRPr/>
+            <a:endParaRPr lang="en-US" dirty="0" smtClean="0"/>
+          </a:p>
+          <a:p>
+            <a:pPr lvl="0">
+              <a:buChar char="❖"/>
+            </a:pPr>
+            <a:endParaRPr lang="en-US" dirty="0"/>
+          </a:p>
+          <a:p>
+            <a:pPr lvl="1">
+              <a:spcBef>
+                <a:spcPts val="0"/>
+              </a:spcBef>
+              <a:buChar char="➢"/>
+            </a:pPr>
+            <a:r>
+              <a:rPr lang="en-US" dirty="0" err="1" smtClean="0"/>
+              <a:t>Cơ</a:t>
+            </a:r>
+            <a:r>
+              <a:rPr lang="en-US" dirty="0" smtClean="0"/>
+              <a:t> </a:t>
+            </a:r>
+            <a:r>
+              <a:rPr lang="en-US" dirty="0" err="1" smtClean="0"/>
+              <a:t>sở</a:t>
+            </a:r>
+            <a:r>
+              <a:rPr lang="en-US" dirty="0" smtClean="0"/>
+              <a:t> </a:t>
+            </a:r>
+            <a:r>
+              <a:rPr lang="en-US" dirty="0" err="1" smtClean="0"/>
+              <a:t>dữ</a:t>
+            </a:r>
+            <a:r>
+              <a:rPr lang="en-US" dirty="0" smtClean="0"/>
+              <a:t> </a:t>
+            </a:r>
+            <a:r>
+              <a:rPr lang="en-US" dirty="0" err="1" smtClean="0"/>
+              <a:t>liệu</a:t>
+            </a:r>
+            <a:r>
+              <a:rPr lang="en-US" dirty="0" smtClean="0"/>
+              <a:t>:</a:t>
+            </a:r>
+          </a:p>
+          <a:p>
+            <a:pPr lvl="2">
+              <a:spcBef>
+                <a:spcPts val="0"/>
+              </a:spcBef>
+            </a:pPr>
+            <a:r>
+              <a:rPr lang="en-US" smtClean="0"/>
+              <a:t>MySQL</a:t>
+            </a:r>
+            <a:endParaRPr lang="en-US" dirty="0"/>
           </a:p>
         </p:txBody>
       </p:sp>

</xml_diff>